<commit_message>
lecture notes and assignments
</commit_message>
<xml_diff>
--- a/lectures/20WQ-02-13 Distributed Computing.pptx
+++ b/lectures/20WQ-02-13 Distributed Computing.pptx
@@ -5,7 +5,7 @@
     <p:sldMasterId id="2147483648" r:id="rId1"/>
   </p:sldMasterIdLst>
   <p:notesMasterIdLst>
-    <p:notesMasterId r:id="rId11"/>
+    <p:notesMasterId r:id="rId10"/>
   </p:notesMasterIdLst>
   <p:sldIdLst>
     <p:sldId id="256" r:id="rId2"/>
@@ -15,8 +15,7 @@
     <p:sldId id="285" r:id="rId6"/>
     <p:sldId id="286" r:id="rId7"/>
     <p:sldId id="287" r:id="rId8"/>
-    <p:sldId id="288" r:id="rId9"/>
-    <p:sldId id="295" r:id="rId10"/>
+    <p:sldId id="295" r:id="rId9"/>
   </p:sldIdLst>
   <p:sldSz cx="12192000" cy="6858000"/>
   <p:notesSz cx="6858000" cy="9144000"/>
@@ -123,6 +122,125 @@
 </p:presentation>
 </file>
 
+<file path=ppt/revisionInfo.xml><?xml version="1.0" encoding="utf-8"?>
+<p1510:revInfo xmlns:a="http://schemas.openxmlformats.org/drawingml/2006/main" xmlns:r="http://schemas.openxmlformats.org/officeDocument/2006/relationships" xmlns:p1510="http://schemas.microsoft.com/office/powerpoint/2015/10/main">
+  <p1510:revLst>
+    <p1510:client id="{FF941748-C969-4D4C-BE5E-604B78BC93DB}" v="4" dt="2020-02-14T00:00:08.032"/>
+  </p1510:revLst>
+</p1510:revInfo>
+</file>
+
+<file path=ppt/changesInfos/changesInfo1.xml><?xml version="1.0" encoding="utf-8"?>
+<pc:chgInfo xmlns:a="http://schemas.openxmlformats.org/drawingml/2006/main" xmlns:r="http://schemas.openxmlformats.org/officeDocument/2006/relationships" xmlns:ac="http://schemas.microsoft.com/office/drawing/2013/main/command" xmlns:pc="http://schemas.microsoft.com/office/powerpoint/2013/main/command">
+  <pc:docChgLst>
+    <pc:chgData name="Michaeljon Miller" userId="c575fe5cddd8b8cf" providerId="LiveId" clId="{FF941748-C969-4D4C-BE5E-604B78BC93DB}"/>
+    <pc:docChg chg="custSel delSld modSld">
+      <pc:chgData name="Michaeljon Miller" userId="c575fe5cddd8b8cf" providerId="LiveId" clId="{FF941748-C969-4D4C-BE5E-604B78BC93DB}" dt="2020-02-14T00:02:08.862" v="447" actId="20577"/>
+      <pc:docMkLst>
+        <pc:docMk/>
+      </pc:docMkLst>
+      <pc:sldChg chg="modSp">
+        <pc:chgData name="Michaeljon Miller" userId="c575fe5cddd8b8cf" providerId="LiveId" clId="{FF941748-C969-4D4C-BE5E-604B78BC93DB}" dt="2020-02-13T23:50:50.944" v="63" actId="12"/>
+        <pc:sldMkLst>
+          <pc:docMk/>
+          <pc:sldMk cId="3231938947" sldId="283"/>
+        </pc:sldMkLst>
+        <pc:spChg chg="mod">
+          <ac:chgData name="Michaeljon Miller" userId="c575fe5cddd8b8cf" providerId="LiveId" clId="{FF941748-C969-4D4C-BE5E-604B78BC93DB}" dt="2020-02-13T23:50:50.944" v="63" actId="12"/>
+          <ac:spMkLst>
+            <pc:docMk/>
+            <pc:sldMk cId="3231938947" sldId="283"/>
+            <ac:spMk id="5" creationId="{00000000-0000-0000-0000-000000000000}"/>
+          </ac:spMkLst>
+        </pc:spChg>
+      </pc:sldChg>
+      <pc:sldChg chg="modSp">
+        <pc:chgData name="Michaeljon Miller" userId="c575fe5cddd8b8cf" providerId="LiveId" clId="{FF941748-C969-4D4C-BE5E-604B78BC93DB}" dt="2020-02-13T23:50:54.380" v="64" actId="12"/>
+        <pc:sldMkLst>
+          <pc:docMk/>
+          <pc:sldMk cId="2322383885" sldId="284"/>
+        </pc:sldMkLst>
+        <pc:spChg chg="mod">
+          <ac:chgData name="Michaeljon Miller" userId="c575fe5cddd8b8cf" providerId="LiveId" clId="{FF941748-C969-4D4C-BE5E-604B78BC93DB}" dt="2020-02-13T23:50:54.380" v="64" actId="12"/>
+          <ac:spMkLst>
+            <pc:docMk/>
+            <pc:sldMk cId="2322383885" sldId="284"/>
+            <ac:spMk id="3" creationId="{00000000-0000-0000-0000-000000000000}"/>
+          </ac:spMkLst>
+        </pc:spChg>
+      </pc:sldChg>
+      <pc:sldChg chg="modSp">
+        <pc:chgData name="Michaeljon Miller" userId="c575fe5cddd8b8cf" providerId="LiveId" clId="{FF941748-C969-4D4C-BE5E-604B78BC93DB}" dt="2020-02-13T23:50:57.434" v="65" actId="12"/>
+        <pc:sldMkLst>
+          <pc:docMk/>
+          <pc:sldMk cId="122452308" sldId="285"/>
+        </pc:sldMkLst>
+        <pc:spChg chg="mod">
+          <ac:chgData name="Michaeljon Miller" userId="c575fe5cddd8b8cf" providerId="LiveId" clId="{FF941748-C969-4D4C-BE5E-604B78BC93DB}" dt="2020-02-13T23:50:57.434" v="65" actId="12"/>
+          <ac:spMkLst>
+            <pc:docMk/>
+            <pc:sldMk cId="122452308" sldId="285"/>
+            <ac:spMk id="3" creationId="{00000000-0000-0000-0000-000000000000}"/>
+          </ac:spMkLst>
+        </pc:spChg>
+      </pc:sldChg>
+      <pc:sldChg chg="modSp">
+        <pc:chgData name="Michaeljon Miller" userId="c575fe5cddd8b8cf" providerId="LiveId" clId="{FF941748-C969-4D4C-BE5E-604B78BC93DB}" dt="2020-02-13T23:51:01.220" v="66" actId="12"/>
+        <pc:sldMkLst>
+          <pc:docMk/>
+          <pc:sldMk cId="2097000118" sldId="286"/>
+        </pc:sldMkLst>
+        <pc:spChg chg="mod">
+          <ac:chgData name="Michaeljon Miller" userId="c575fe5cddd8b8cf" providerId="LiveId" clId="{FF941748-C969-4D4C-BE5E-604B78BC93DB}" dt="2020-02-13T23:51:01.220" v="66" actId="12"/>
+          <ac:spMkLst>
+            <pc:docMk/>
+            <pc:sldMk cId="2097000118" sldId="286"/>
+            <ac:spMk id="3" creationId="{00000000-0000-0000-0000-000000000000}"/>
+          </ac:spMkLst>
+        </pc:spChg>
+      </pc:sldChg>
+      <pc:sldChg chg="modSp">
+        <pc:chgData name="Michaeljon Miller" userId="c575fe5cddd8b8cf" providerId="LiveId" clId="{FF941748-C969-4D4C-BE5E-604B78BC93DB}" dt="2020-02-13T23:51:04.436" v="67" actId="12"/>
+        <pc:sldMkLst>
+          <pc:docMk/>
+          <pc:sldMk cId="2091693717" sldId="287"/>
+        </pc:sldMkLst>
+        <pc:spChg chg="mod">
+          <ac:chgData name="Michaeljon Miller" userId="c575fe5cddd8b8cf" providerId="LiveId" clId="{FF941748-C969-4D4C-BE5E-604B78BC93DB}" dt="2020-02-13T23:51:04.436" v="67" actId="12"/>
+          <ac:spMkLst>
+            <pc:docMk/>
+            <pc:sldMk cId="2091693717" sldId="287"/>
+            <ac:spMk id="3" creationId="{00000000-0000-0000-0000-000000000000}"/>
+          </ac:spMkLst>
+        </pc:spChg>
+      </pc:sldChg>
+      <pc:sldChg chg="del">
+        <pc:chgData name="Michaeljon Miller" userId="c575fe5cddd8b8cf" providerId="LiveId" clId="{FF941748-C969-4D4C-BE5E-604B78BC93DB}" dt="2020-02-13T23:49:34.112" v="0" actId="2696"/>
+        <pc:sldMkLst>
+          <pc:docMk/>
+          <pc:sldMk cId="1948856545" sldId="288"/>
+        </pc:sldMkLst>
+      </pc:sldChg>
+      <pc:sldChg chg="modSp">
+        <pc:chgData name="Michaeljon Miller" userId="c575fe5cddd8b8cf" providerId="LiveId" clId="{FF941748-C969-4D4C-BE5E-604B78BC93DB}" dt="2020-02-14T00:02:08.862" v="447" actId="20577"/>
+        <pc:sldMkLst>
+          <pc:docMk/>
+          <pc:sldMk cId="943333449" sldId="295"/>
+        </pc:sldMkLst>
+        <pc:spChg chg="mod">
+          <ac:chgData name="Michaeljon Miller" userId="c575fe5cddd8b8cf" providerId="LiveId" clId="{FF941748-C969-4D4C-BE5E-604B78BC93DB}" dt="2020-02-14T00:02:08.862" v="447" actId="20577"/>
+          <ac:spMkLst>
+            <pc:docMk/>
+            <pc:sldMk cId="943333449" sldId="295"/>
+            <ac:spMk id="6" creationId="{00000000-0000-0000-0000-000000000000}"/>
+          </ac:spMkLst>
+        </pc:spChg>
+      </pc:sldChg>
+    </pc:docChg>
+  </pc:docChgLst>
+</pc:chgInfo>
+</file>
+
 <file path=ppt/notesMasters/notesMaster1.xml><?xml version="1.0" encoding="utf-8"?>
 <p:notesMaster xmlns:a="http://schemas.openxmlformats.org/drawingml/2006/main" xmlns:r="http://schemas.openxmlformats.org/officeDocument/2006/relationships" xmlns:p="http://schemas.openxmlformats.org/presentationml/2006/main">
   <p:cSld>
@@ -205,7 +323,7 @@
           <a:p>
             <a:fld id="{B30C5654-8255-4741-B5E4-F40A45C3546B}" type="datetimeFigureOut">
               <a:rPr lang="en-US" smtClean="0"/>
-              <a:t>4/29/16</a:t>
+              <a:t>2/13/20</a:t>
             </a:fld>
             <a:endParaRPr lang="en-US"/>
           </a:p>
@@ -269,38 +387,37 @@
           <a:p>
             <a:pPr lvl="0"/>
             <a:r>
-              <a:rPr lang="en-US" smtClean="0"/>
+              <a:rPr lang="en-US"/>
               <a:t>Click to edit Master text styles</a:t>
             </a:r>
           </a:p>
           <a:p>
             <a:pPr lvl="1"/>
             <a:r>
-              <a:rPr lang="en-US" smtClean="0"/>
+              <a:rPr lang="en-US"/>
               <a:t>Second level</a:t>
             </a:r>
           </a:p>
           <a:p>
             <a:pPr lvl="2"/>
             <a:r>
-              <a:rPr lang="en-US" smtClean="0"/>
+              <a:rPr lang="en-US"/>
               <a:t>Third level</a:t>
             </a:r>
           </a:p>
           <a:p>
             <a:pPr lvl="3"/>
             <a:r>
-              <a:rPr lang="en-US" smtClean="0"/>
+              <a:rPr lang="en-US"/>
               <a:t>Fourth level</a:t>
             </a:r>
           </a:p>
           <a:p>
             <a:pPr lvl="4"/>
             <a:r>
-              <a:rPr lang="en-US" smtClean="0"/>
+              <a:rPr lang="en-US"/>
               <a:t>Fifth level</a:t>
             </a:r>
-            <a:endParaRPr lang="en-US"/>
           </a:p>
         </p:txBody>
       </p:sp>
@@ -473,6 +590,174 @@
 </p:notesMaster>
 </file>
 
+<file path=ppt/notesSlides/notesSlide1.xml><?xml version="1.0" encoding="utf-8"?>
+<p:notes xmlns:a="http://schemas.openxmlformats.org/drawingml/2006/main" xmlns:r="http://schemas.openxmlformats.org/officeDocument/2006/relationships" xmlns:p="http://schemas.openxmlformats.org/presentationml/2006/main">
+  <p:cSld>
+    <p:spTree>
+      <p:nvGrpSpPr>
+        <p:cNvPr id="1" name=""/>
+        <p:cNvGrpSpPr/>
+        <p:nvPr/>
+      </p:nvGrpSpPr>
+      <p:grpSpPr>
+        <a:xfrm>
+          <a:off x="0" y="0"/>
+          <a:ext cx="0" cy="0"/>
+          <a:chOff x="0" y="0"/>
+          <a:chExt cx="0" cy="0"/>
+        </a:xfrm>
+      </p:grpSpPr>
+      <p:sp>
+        <p:nvSpPr>
+          <p:cNvPr id="2" name="Slide Image Placeholder 1"/>
+          <p:cNvSpPr>
+            <a:spLocks noGrp="1" noRot="1" noChangeAspect="1"/>
+          </p:cNvSpPr>
+          <p:nvPr>
+            <p:ph type="sldImg"/>
+          </p:nvPr>
+        </p:nvSpPr>
+        <p:spPr/>
+      </p:sp>
+      <p:sp>
+        <p:nvSpPr>
+          <p:cNvPr id="3" name="Notes Placeholder 2"/>
+          <p:cNvSpPr>
+            <a:spLocks noGrp="1"/>
+          </p:cNvSpPr>
+          <p:nvPr>
+            <p:ph type="body" idx="1"/>
+          </p:nvPr>
+        </p:nvSpPr>
+        <p:spPr/>
+        <p:txBody>
+          <a:bodyPr/>
+          <a:lstStyle/>
+          <a:p>
+            <a:endParaRPr lang="en-US" dirty="0"/>
+          </a:p>
+        </p:txBody>
+      </p:sp>
+      <p:sp>
+        <p:nvSpPr>
+          <p:cNvPr id="4" name="Slide Number Placeholder 3"/>
+          <p:cNvSpPr>
+            <a:spLocks noGrp="1"/>
+          </p:cNvSpPr>
+          <p:nvPr>
+            <p:ph type="sldNum" sz="quarter" idx="5"/>
+          </p:nvPr>
+        </p:nvSpPr>
+        <p:spPr/>
+        <p:txBody>
+          <a:bodyPr/>
+          <a:lstStyle/>
+          <a:p>
+            <a:fld id="{E58294B0-43FA-4697-A94A-C7D8A3CEE26B}" type="slidenum">
+              <a:rPr lang="en-US" smtClean="0"/>
+              <a:t>1</a:t>
+            </a:fld>
+            <a:endParaRPr lang="en-US"/>
+          </a:p>
+        </p:txBody>
+      </p:sp>
+    </p:spTree>
+    <p:extLst>
+      <p:ext uri="{BB962C8B-B14F-4D97-AF65-F5344CB8AC3E}">
+        <p14:creationId xmlns:p14="http://schemas.microsoft.com/office/powerpoint/2010/main" val="1694731172"/>
+      </p:ext>
+    </p:extLst>
+  </p:cSld>
+  <p:clrMapOvr>
+    <a:masterClrMapping/>
+  </p:clrMapOvr>
+</p:notes>
+</file>
+
+<file path=ppt/notesSlides/notesSlide2.xml><?xml version="1.0" encoding="utf-8"?>
+<p:notes xmlns:a="http://schemas.openxmlformats.org/drawingml/2006/main" xmlns:r="http://schemas.openxmlformats.org/officeDocument/2006/relationships" xmlns:p="http://schemas.openxmlformats.org/presentationml/2006/main">
+  <p:cSld>
+    <p:spTree>
+      <p:nvGrpSpPr>
+        <p:cNvPr id="1" name=""/>
+        <p:cNvGrpSpPr/>
+        <p:nvPr/>
+      </p:nvGrpSpPr>
+      <p:grpSpPr>
+        <a:xfrm>
+          <a:off x="0" y="0"/>
+          <a:ext cx="0" cy="0"/>
+          <a:chOff x="0" y="0"/>
+          <a:chExt cx="0" cy="0"/>
+        </a:xfrm>
+      </p:grpSpPr>
+      <p:sp>
+        <p:nvSpPr>
+          <p:cNvPr id="2" name="Slide Image Placeholder 1"/>
+          <p:cNvSpPr>
+            <a:spLocks noGrp="1" noRot="1" noChangeAspect="1"/>
+          </p:cNvSpPr>
+          <p:nvPr>
+            <p:ph type="sldImg"/>
+          </p:nvPr>
+        </p:nvSpPr>
+        <p:spPr/>
+      </p:sp>
+      <p:sp>
+        <p:nvSpPr>
+          <p:cNvPr id="3" name="Notes Placeholder 2"/>
+          <p:cNvSpPr>
+            <a:spLocks noGrp="1"/>
+          </p:cNvSpPr>
+          <p:nvPr>
+            <p:ph type="body" idx="1"/>
+          </p:nvPr>
+        </p:nvSpPr>
+        <p:spPr/>
+        <p:txBody>
+          <a:bodyPr/>
+          <a:lstStyle/>
+          <a:p>
+            <a:endParaRPr lang="en-US"/>
+          </a:p>
+        </p:txBody>
+      </p:sp>
+      <p:sp>
+        <p:nvSpPr>
+          <p:cNvPr id="4" name="Slide Number Placeholder 3"/>
+          <p:cNvSpPr>
+            <a:spLocks noGrp="1"/>
+          </p:cNvSpPr>
+          <p:nvPr>
+            <p:ph type="sldNum" sz="quarter" idx="5"/>
+          </p:nvPr>
+        </p:nvSpPr>
+        <p:spPr/>
+        <p:txBody>
+          <a:bodyPr/>
+          <a:lstStyle/>
+          <a:p>
+            <a:fld id="{E58294B0-43FA-4697-A94A-C7D8A3CEE26B}" type="slidenum">
+              <a:rPr lang="en-US" smtClean="0"/>
+              <a:t>8</a:t>
+            </a:fld>
+            <a:endParaRPr lang="en-US"/>
+          </a:p>
+        </p:txBody>
+      </p:sp>
+    </p:spTree>
+    <p:extLst>
+      <p:ext uri="{BB962C8B-B14F-4D97-AF65-F5344CB8AC3E}">
+        <p14:creationId xmlns:p14="http://schemas.microsoft.com/office/powerpoint/2010/main" val="9296984"/>
+      </p:ext>
+    </p:extLst>
+  </p:cSld>
+  <p:clrMapOvr>
+    <a:masterClrMapping/>
+  </p:clrMapOvr>
+</p:notes>
+</file>
+
 <file path=ppt/slideLayouts/slideLayout1.xml><?xml version="1.0" encoding="utf-8"?>
 <p:sldLayout xmlns:a="http://schemas.openxmlformats.org/drawingml/2006/main" xmlns:r="http://schemas.openxmlformats.org/officeDocument/2006/relationships" xmlns:p="http://schemas.openxmlformats.org/presentationml/2006/main" type="title" preserve="1">
   <p:cSld name="Title Slide">
@@ -515,10 +800,9 @@
           </a:lstStyle>
           <a:p>
             <a:r>
-              <a:rPr lang="en-US" smtClean="0"/>
+              <a:rPr lang="en-US"/>
               <a:t>Click to edit Master title style</a:t>
             </a:r>
-            <a:endParaRPr lang="en-US"/>
           </a:p>
         </p:txBody>
       </p:sp>
@@ -580,10 +864,9 @@
           </a:lstStyle>
           <a:p>
             <a:r>
-              <a:rPr lang="en-US" smtClean="0"/>
+              <a:rPr lang="en-US"/>
               <a:t>Click to edit Master subtitle style</a:t>
             </a:r>
-            <a:endParaRPr lang="en-US"/>
           </a:p>
         </p:txBody>
       </p:sp>
@@ -604,7 +887,7 @@
           <a:p>
             <a:fld id="{1E1327A7-1338-42E3-A376-4DBDA53A9DB0}" type="datetimeFigureOut">
               <a:rPr lang="en-US" smtClean="0"/>
-              <a:t>4/29/16</a:t>
+              <a:t>2/13/20</a:t>
             </a:fld>
             <a:endParaRPr lang="en-US"/>
           </a:p>
@@ -698,10 +981,9 @@
           <a:lstStyle/>
           <a:p>
             <a:r>
-              <a:rPr lang="en-US" smtClean="0"/>
+              <a:rPr lang="en-US"/>
               <a:t>Click to edit Master title style</a:t>
             </a:r>
-            <a:endParaRPr lang="en-US"/>
           </a:p>
         </p:txBody>
       </p:sp>
@@ -722,38 +1004,37 @@
           <a:p>
             <a:pPr lvl="0"/>
             <a:r>
-              <a:rPr lang="en-US" smtClean="0"/>
+              <a:rPr lang="en-US"/>
               <a:t>Click to edit Master text styles</a:t>
             </a:r>
           </a:p>
           <a:p>
             <a:pPr lvl="1"/>
             <a:r>
-              <a:rPr lang="en-US" smtClean="0"/>
+              <a:rPr lang="en-US"/>
               <a:t>Second level</a:t>
             </a:r>
           </a:p>
           <a:p>
             <a:pPr lvl="2"/>
             <a:r>
-              <a:rPr lang="en-US" smtClean="0"/>
+              <a:rPr lang="en-US"/>
               <a:t>Third level</a:t>
             </a:r>
           </a:p>
           <a:p>
             <a:pPr lvl="3"/>
             <a:r>
-              <a:rPr lang="en-US" smtClean="0"/>
+              <a:rPr lang="en-US"/>
               <a:t>Fourth level</a:t>
             </a:r>
           </a:p>
           <a:p>
             <a:pPr lvl="4"/>
             <a:r>
-              <a:rPr lang="en-US" smtClean="0"/>
+              <a:rPr lang="en-US"/>
               <a:t>Fifth level</a:t>
             </a:r>
-            <a:endParaRPr lang="en-US"/>
           </a:p>
         </p:txBody>
       </p:sp>
@@ -774,7 +1055,7 @@
           <a:p>
             <a:fld id="{1E1327A7-1338-42E3-A376-4DBDA53A9DB0}" type="datetimeFigureOut">
               <a:rPr lang="en-US" smtClean="0"/>
-              <a:t>4/29/16</a:t>
+              <a:t>2/13/20</a:t>
             </a:fld>
             <a:endParaRPr lang="en-US"/>
           </a:p>
@@ -873,10 +1154,9 @@
           <a:lstStyle/>
           <a:p>
             <a:r>
-              <a:rPr lang="en-US" smtClean="0"/>
+              <a:rPr lang="en-US"/>
               <a:t>Click to edit Master title style</a:t>
             </a:r>
-            <a:endParaRPr lang="en-US"/>
           </a:p>
         </p:txBody>
       </p:sp>
@@ -902,38 +1182,37 @@
           <a:p>
             <a:pPr lvl="0"/>
             <a:r>
-              <a:rPr lang="en-US" smtClean="0"/>
+              <a:rPr lang="en-US"/>
               <a:t>Click to edit Master text styles</a:t>
             </a:r>
           </a:p>
           <a:p>
             <a:pPr lvl="1"/>
             <a:r>
-              <a:rPr lang="en-US" smtClean="0"/>
+              <a:rPr lang="en-US"/>
               <a:t>Second level</a:t>
             </a:r>
           </a:p>
           <a:p>
             <a:pPr lvl="2"/>
             <a:r>
-              <a:rPr lang="en-US" smtClean="0"/>
+              <a:rPr lang="en-US"/>
               <a:t>Third level</a:t>
             </a:r>
           </a:p>
           <a:p>
             <a:pPr lvl="3"/>
             <a:r>
-              <a:rPr lang="en-US" smtClean="0"/>
+              <a:rPr lang="en-US"/>
               <a:t>Fourth level</a:t>
             </a:r>
           </a:p>
           <a:p>
             <a:pPr lvl="4"/>
             <a:r>
-              <a:rPr lang="en-US" smtClean="0"/>
+              <a:rPr lang="en-US"/>
               <a:t>Fifth level</a:t>
             </a:r>
-            <a:endParaRPr lang="en-US"/>
           </a:p>
         </p:txBody>
       </p:sp>
@@ -954,7 +1233,7 @@
           <a:p>
             <a:fld id="{1E1327A7-1338-42E3-A376-4DBDA53A9DB0}" type="datetimeFigureOut">
               <a:rPr lang="en-US" smtClean="0"/>
-              <a:t>4/29/16</a:t>
+              <a:t>2/13/20</a:t>
             </a:fld>
             <a:endParaRPr lang="en-US"/>
           </a:p>
@@ -1048,10 +1327,9 @@
           <a:lstStyle/>
           <a:p>
             <a:r>
-              <a:rPr lang="en-US" smtClean="0"/>
+              <a:rPr lang="en-US"/>
               <a:t>Click to edit Master title style</a:t>
             </a:r>
-            <a:endParaRPr lang="en-US"/>
           </a:p>
         </p:txBody>
       </p:sp>
@@ -1072,38 +1350,37 @@
           <a:p>
             <a:pPr lvl="0"/>
             <a:r>
-              <a:rPr lang="en-US" smtClean="0"/>
+              <a:rPr lang="en-US"/>
               <a:t>Click to edit Master text styles</a:t>
             </a:r>
           </a:p>
           <a:p>
             <a:pPr lvl="1"/>
             <a:r>
-              <a:rPr lang="en-US" smtClean="0"/>
+              <a:rPr lang="en-US"/>
               <a:t>Second level</a:t>
             </a:r>
           </a:p>
           <a:p>
             <a:pPr lvl="2"/>
             <a:r>
-              <a:rPr lang="en-US" smtClean="0"/>
+              <a:rPr lang="en-US"/>
               <a:t>Third level</a:t>
             </a:r>
           </a:p>
           <a:p>
             <a:pPr lvl="3"/>
             <a:r>
-              <a:rPr lang="en-US" smtClean="0"/>
+              <a:rPr lang="en-US"/>
               <a:t>Fourth level</a:t>
             </a:r>
           </a:p>
           <a:p>
             <a:pPr lvl="4"/>
             <a:r>
-              <a:rPr lang="en-US" smtClean="0"/>
+              <a:rPr lang="en-US"/>
               <a:t>Fifth level</a:t>
             </a:r>
-            <a:endParaRPr lang="en-US"/>
           </a:p>
         </p:txBody>
       </p:sp>
@@ -1124,7 +1401,7 @@
           <a:p>
             <a:fld id="{1E1327A7-1338-42E3-A376-4DBDA53A9DB0}" type="datetimeFigureOut">
               <a:rPr lang="en-US" smtClean="0"/>
-              <a:t>4/29/16</a:t>
+              <a:t>2/13/20</a:t>
             </a:fld>
             <a:endParaRPr lang="en-US"/>
           </a:p>
@@ -1227,10 +1504,9 @@
           </a:lstStyle>
           <a:p>
             <a:r>
-              <a:rPr lang="en-US" smtClean="0"/>
+              <a:rPr lang="en-US"/>
               <a:t>Click to edit Master title style</a:t>
             </a:r>
-            <a:endParaRPr lang="en-US"/>
           </a:p>
         </p:txBody>
       </p:sp>
@@ -1347,7 +1623,7 @@
           <a:p>
             <a:pPr lvl="0"/>
             <a:r>
-              <a:rPr lang="en-US" smtClean="0"/>
+              <a:rPr lang="en-US"/>
               <a:t>Click to edit Master text styles</a:t>
             </a:r>
           </a:p>
@@ -1370,7 +1646,7 @@
           <a:p>
             <a:fld id="{1E1327A7-1338-42E3-A376-4DBDA53A9DB0}" type="datetimeFigureOut">
               <a:rPr lang="en-US" smtClean="0"/>
-              <a:t>4/29/16</a:t>
+              <a:t>2/13/20</a:t>
             </a:fld>
             <a:endParaRPr lang="en-US"/>
           </a:p>
@@ -1464,10 +1740,9 @@
           <a:lstStyle/>
           <a:p>
             <a:r>
-              <a:rPr lang="en-US" smtClean="0"/>
+              <a:rPr lang="en-US"/>
               <a:t>Click to edit Master title style</a:t>
             </a:r>
-            <a:endParaRPr lang="en-US"/>
           </a:p>
         </p:txBody>
       </p:sp>
@@ -1493,38 +1768,37 @@
           <a:p>
             <a:pPr lvl="0"/>
             <a:r>
-              <a:rPr lang="en-US" smtClean="0"/>
+              <a:rPr lang="en-US"/>
               <a:t>Click to edit Master text styles</a:t>
             </a:r>
           </a:p>
           <a:p>
             <a:pPr lvl="1"/>
             <a:r>
-              <a:rPr lang="en-US" smtClean="0"/>
+              <a:rPr lang="en-US"/>
               <a:t>Second level</a:t>
             </a:r>
           </a:p>
           <a:p>
             <a:pPr lvl="2"/>
             <a:r>
-              <a:rPr lang="en-US" smtClean="0"/>
+              <a:rPr lang="en-US"/>
               <a:t>Third level</a:t>
             </a:r>
           </a:p>
           <a:p>
             <a:pPr lvl="3"/>
             <a:r>
-              <a:rPr lang="en-US" smtClean="0"/>
+              <a:rPr lang="en-US"/>
               <a:t>Fourth level</a:t>
             </a:r>
           </a:p>
           <a:p>
             <a:pPr lvl="4"/>
             <a:r>
-              <a:rPr lang="en-US" smtClean="0"/>
+              <a:rPr lang="en-US"/>
               <a:t>Fifth level</a:t>
             </a:r>
-            <a:endParaRPr lang="en-US"/>
           </a:p>
         </p:txBody>
       </p:sp>
@@ -1550,38 +1824,37 @@
           <a:p>
             <a:pPr lvl="0"/>
             <a:r>
-              <a:rPr lang="en-US" smtClean="0"/>
+              <a:rPr lang="en-US"/>
               <a:t>Click to edit Master text styles</a:t>
             </a:r>
           </a:p>
           <a:p>
             <a:pPr lvl="1"/>
             <a:r>
-              <a:rPr lang="en-US" smtClean="0"/>
+              <a:rPr lang="en-US"/>
               <a:t>Second level</a:t>
             </a:r>
           </a:p>
           <a:p>
             <a:pPr lvl="2"/>
             <a:r>
-              <a:rPr lang="en-US" smtClean="0"/>
+              <a:rPr lang="en-US"/>
               <a:t>Third level</a:t>
             </a:r>
           </a:p>
           <a:p>
             <a:pPr lvl="3"/>
             <a:r>
-              <a:rPr lang="en-US" smtClean="0"/>
+              <a:rPr lang="en-US"/>
               <a:t>Fourth level</a:t>
             </a:r>
           </a:p>
           <a:p>
             <a:pPr lvl="4"/>
             <a:r>
-              <a:rPr lang="en-US" smtClean="0"/>
+              <a:rPr lang="en-US"/>
               <a:t>Fifth level</a:t>
             </a:r>
-            <a:endParaRPr lang="en-US"/>
           </a:p>
         </p:txBody>
       </p:sp>
@@ -1602,7 +1875,7 @@
           <a:p>
             <a:fld id="{1E1327A7-1338-42E3-A376-4DBDA53A9DB0}" type="datetimeFigureOut">
               <a:rPr lang="en-US" smtClean="0"/>
-              <a:t>4/29/16</a:t>
+              <a:t>2/13/20</a:t>
             </a:fld>
             <a:endParaRPr lang="en-US"/>
           </a:p>
@@ -1701,10 +1974,9 @@
           <a:lstStyle/>
           <a:p>
             <a:r>
-              <a:rPr lang="en-US" smtClean="0"/>
+              <a:rPr lang="en-US"/>
               <a:t>Click to edit Master title style</a:t>
             </a:r>
-            <a:endParaRPr lang="en-US"/>
           </a:p>
         </p:txBody>
       </p:sp>
@@ -1767,7 +2039,7 @@
           <a:p>
             <a:pPr lvl="0"/>
             <a:r>
-              <a:rPr lang="en-US" smtClean="0"/>
+              <a:rPr lang="en-US"/>
               <a:t>Click to edit Master text styles</a:t>
             </a:r>
           </a:p>
@@ -1795,38 +2067,37 @@
           <a:p>
             <a:pPr lvl="0"/>
             <a:r>
-              <a:rPr lang="en-US" smtClean="0"/>
+              <a:rPr lang="en-US"/>
               <a:t>Click to edit Master text styles</a:t>
             </a:r>
           </a:p>
           <a:p>
             <a:pPr lvl="1"/>
             <a:r>
-              <a:rPr lang="en-US" smtClean="0"/>
+              <a:rPr lang="en-US"/>
               <a:t>Second level</a:t>
             </a:r>
           </a:p>
           <a:p>
             <a:pPr lvl="2"/>
             <a:r>
-              <a:rPr lang="en-US" smtClean="0"/>
+              <a:rPr lang="en-US"/>
               <a:t>Third level</a:t>
             </a:r>
           </a:p>
           <a:p>
             <a:pPr lvl="3"/>
             <a:r>
-              <a:rPr lang="en-US" smtClean="0"/>
+              <a:rPr lang="en-US"/>
               <a:t>Fourth level</a:t>
             </a:r>
           </a:p>
           <a:p>
             <a:pPr lvl="4"/>
             <a:r>
-              <a:rPr lang="en-US" smtClean="0"/>
+              <a:rPr lang="en-US"/>
               <a:t>Fifth level</a:t>
             </a:r>
-            <a:endParaRPr lang="en-US"/>
           </a:p>
         </p:txBody>
       </p:sp>
@@ -1889,7 +2160,7 @@
           <a:p>
             <a:pPr lvl="0"/>
             <a:r>
-              <a:rPr lang="en-US" smtClean="0"/>
+              <a:rPr lang="en-US"/>
               <a:t>Click to edit Master text styles</a:t>
             </a:r>
           </a:p>
@@ -1917,38 +2188,37 @@
           <a:p>
             <a:pPr lvl="0"/>
             <a:r>
-              <a:rPr lang="en-US" smtClean="0"/>
+              <a:rPr lang="en-US"/>
               <a:t>Click to edit Master text styles</a:t>
             </a:r>
           </a:p>
           <a:p>
             <a:pPr lvl="1"/>
             <a:r>
-              <a:rPr lang="en-US" smtClean="0"/>
+              <a:rPr lang="en-US"/>
               <a:t>Second level</a:t>
             </a:r>
           </a:p>
           <a:p>
             <a:pPr lvl="2"/>
             <a:r>
-              <a:rPr lang="en-US" smtClean="0"/>
+              <a:rPr lang="en-US"/>
               <a:t>Third level</a:t>
             </a:r>
           </a:p>
           <a:p>
             <a:pPr lvl="3"/>
             <a:r>
-              <a:rPr lang="en-US" smtClean="0"/>
+              <a:rPr lang="en-US"/>
               <a:t>Fourth level</a:t>
             </a:r>
           </a:p>
           <a:p>
             <a:pPr lvl="4"/>
             <a:r>
-              <a:rPr lang="en-US" smtClean="0"/>
+              <a:rPr lang="en-US"/>
               <a:t>Fifth level</a:t>
             </a:r>
-            <a:endParaRPr lang="en-US"/>
           </a:p>
         </p:txBody>
       </p:sp>
@@ -1969,7 +2239,7 @@
           <a:p>
             <a:fld id="{1E1327A7-1338-42E3-A376-4DBDA53A9DB0}" type="datetimeFigureOut">
               <a:rPr lang="en-US" smtClean="0"/>
-              <a:t>4/29/16</a:t>
+              <a:t>2/13/20</a:t>
             </a:fld>
             <a:endParaRPr lang="en-US"/>
           </a:p>
@@ -2063,10 +2333,9 @@
           <a:lstStyle/>
           <a:p>
             <a:r>
-              <a:rPr lang="en-US" smtClean="0"/>
+              <a:rPr lang="en-US"/>
               <a:t>Click to edit Master title style</a:t>
             </a:r>
-            <a:endParaRPr lang="en-US"/>
           </a:p>
         </p:txBody>
       </p:sp>
@@ -2087,7 +2356,7 @@
           <a:p>
             <a:fld id="{1E1327A7-1338-42E3-A376-4DBDA53A9DB0}" type="datetimeFigureOut">
               <a:rPr lang="en-US" smtClean="0"/>
-              <a:t>4/29/16</a:t>
+              <a:t>2/13/20</a:t>
             </a:fld>
             <a:endParaRPr lang="en-US"/>
           </a:p>
@@ -2182,7 +2451,7 @@
           <a:p>
             <a:fld id="{1E1327A7-1338-42E3-A376-4DBDA53A9DB0}" type="datetimeFigureOut">
               <a:rPr lang="en-US" smtClean="0"/>
-              <a:t>4/29/16</a:t>
+              <a:t>2/13/20</a:t>
             </a:fld>
             <a:endParaRPr lang="en-US"/>
           </a:p>
@@ -2285,10 +2554,9 @@
           </a:lstStyle>
           <a:p>
             <a:r>
-              <a:rPr lang="en-US" smtClean="0"/>
+              <a:rPr lang="en-US"/>
               <a:t>Click to edit Master title style</a:t>
             </a:r>
-            <a:endParaRPr lang="en-US"/>
           </a:p>
         </p:txBody>
       </p:sp>
@@ -2342,38 +2610,37 @@
           <a:p>
             <a:pPr lvl="0"/>
             <a:r>
-              <a:rPr lang="en-US" smtClean="0"/>
+              <a:rPr lang="en-US"/>
               <a:t>Click to edit Master text styles</a:t>
             </a:r>
           </a:p>
           <a:p>
             <a:pPr lvl="1"/>
             <a:r>
-              <a:rPr lang="en-US" smtClean="0"/>
+              <a:rPr lang="en-US"/>
               <a:t>Second level</a:t>
             </a:r>
           </a:p>
           <a:p>
             <a:pPr lvl="2"/>
             <a:r>
-              <a:rPr lang="en-US" smtClean="0"/>
+              <a:rPr lang="en-US"/>
               <a:t>Third level</a:t>
             </a:r>
           </a:p>
           <a:p>
             <a:pPr lvl="3"/>
             <a:r>
-              <a:rPr lang="en-US" smtClean="0"/>
+              <a:rPr lang="en-US"/>
               <a:t>Fourth level</a:t>
             </a:r>
           </a:p>
           <a:p>
             <a:pPr lvl="4"/>
             <a:r>
-              <a:rPr lang="en-US" smtClean="0"/>
+              <a:rPr lang="en-US"/>
               <a:t>Fifth level</a:t>
             </a:r>
-            <a:endParaRPr lang="en-US"/>
           </a:p>
         </p:txBody>
       </p:sp>
@@ -2436,7 +2703,7 @@
           <a:p>
             <a:pPr lvl="0"/>
             <a:r>
-              <a:rPr lang="en-US" smtClean="0"/>
+              <a:rPr lang="en-US"/>
               <a:t>Click to edit Master text styles</a:t>
             </a:r>
           </a:p>
@@ -2459,7 +2726,7 @@
           <a:p>
             <a:fld id="{1E1327A7-1338-42E3-A376-4DBDA53A9DB0}" type="datetimeFigureOut">
               <a:rPr lang="en-US" smtClean="0"/>
-              <a:t>4/29/16</a:t>
+              <a:t>2/13/20</a:t>
             </a:fld>
             <a:endParaRPr lang="en-US"/>
           </a:p>
@@ -2562,10 +2829,9 @@
           </a:lstStyle>
           <a:p>
             <a:r>
-              <a:rPr lang="en-US" smtClean="0"/>
+              <a:rPr lang="en-US"/>
               <a:t>Click to edit Master title style</a:t>
             </a:r>
-            <a:endParaRPr lang="en-US"/>
           </a:p>
         </p:txBody>
       </p:sp>
@@ -2689,7 +2955,7 @@
           <a:p>
             <a:pPr lvl="0"/>
             <a:r>
-              <a:rPr lang="en-US" smtClean="0"/>
+              <a:rPr lang="en-US"/>
               <a:t>Click to edit Master text styles</a:t>
             </a:r>
           </a:p>
@@ -2712,7 +2978,7 @@
           <a:p>
             <a:fld id="{1E1327A7-1338-42E3-A376-4DBDA53A9DB0}" type="datetimeFigureOut">
               <a:rPr lang="en-US" smtClean="0"/>
-              <a:t>4/29/16</a:t>
+              <a:t>2/13/20</a:t>
             </a:fld>
             <a:endParaRPr lang="en-US"/>
           </a:p>
@@ -2821,10 +3087,9 @@
           <a:lstStyle/>
           <a:p>
             <a:r>
-              <a:rPr lang="en-US" smtClean="0"/>
+              <a:rPr lang="en-US"/>
               <a:t>Click to edit Master title style</a:t>
             </a:r>
-            <a:endParaRPr lang="en-US"/>
           </a:p>
         </p:txBody>
       </p:sp>
@@ -2855,38 +3120,37 @@
           <a:p>
             <a:pPr lvl="0"/>
             <a:r>
-              <a:rPr lang="en-US" smtClean="0"/>
+              <a:rPr lang="en-US"/>
               <a:t>Click to edit Master text styles</a:t>
             </a:r>
           </a:p>
           <a:p>
             <a:pPr lvl="1"/>
             <a:r>
-              <a:rPr lang="en-US" smtClean="0"/>
+              <a:rPr lang="en-US"/>
               <a:t>Second level</a:t>
             </a:r>
           </a:p>
           <a:p>
             <a:pPr lvl="2"/>
             <a:r>
-              <a:rPr lang="en-US" smtClean="0"/>
+              <a:rPr lang="en-US"/>
               <a:t>Third level</a:t>
             </a:r>
           </a:p>
           <a:p>
             <a:pPr lvl="3"/>
             <a:r>
-              <a:rPr lang="en-US" smtClean="0"/>
+              <a:rPr lang="en-US"/>
               <a:t>Fourth level</a:t>
             </a:r>
           </a:p>
           <a:p>
             <a:pPr lvl="4"/>
             <a:r>
-              <a:rPr lang="en-US" smtClean="0"/>
+              <a:rPr lang="en-US"/>
               <a:t>Fifth level</a:t>
             </a:r>
-            <a:endParaRPr lang="en-US"/>
           </a:p>
         </p:txBody>
       </p:sp>
@@ -2925,7 +3189,7 @@
           <a:p>
             <a:fld id="{1E1327A7-1338-42E3-A376-4DBDA53A9DB0}" type="datetimeFigureOut">
               <a:rPr lang="en-US" smtClean="0"/>
-              <a:t>4/29/16</a:t>
+              <a:t>2/13/20</a:t>
             </a:fld>
             <a:endParaRPr lang="en-US"/>
           </a:p>
@@ -3346,10 +3610,9 @@
           <a:lstStyle/>
           <a:p>
             <a:r>
-              <a:rPr lang="en-US" dirty="0" smtClean="0"/>
+              <a:rPr lang="en-US" dirty="0"/>
               <a:t>SEGR 531</a:t>
             </a:r>
-            <a:endParaRPr lang="en-US" dirty="0"/>
           </a:p>
         </p:txBody>
       </p:sp>
@@ -3369,10 +3632,9 @@
           <a:lstStyle/>
           <a:p>
             <a:r>
-              <a:rPr lang="en-US" dirty="0" smtClean="0"/>
+              <a:rPr lang="en-US" dirty="0"/>
               <a:t>23 April 2014</a:t>
             </a:r>
-            <a:endParaRPr lang="en-US" dirty="0"/>
           </a:p>
         </p:txBody>
       </p:sp>
@@ -3386,13 +3648,6 @@
   <p:clrMapOvr>
     <a:masterClrMapping/>
   </p:clrMapOvr>
-  <p:timing>
-    <p:tnLst>
-      <p:par>
-        <p:cTn id="1" dur="indefinite" restart="never" nodeType="tmRoot"/>
-      </p:par>
-    </p:tnLst>
-  </p:timing>
 </p:sld>
 </file>
 
@@ -3429,10 +3684,9 @@
           <a:lstStyle/>
           <a:p>
             <a:r>
-              <a:rPr lang="en-US" dirty="0" smtClean="0"/>
+              <a:rPr lang="en-US" dirty="0"/>
               <a:t>Distributed Computing</a:t>
             </a:r>
-            <a:endParaRPr lang="en-US" dirty="0"/>
           </a:p>
         </p:txBody>
       </p:sp>
@@ -3452,10 +3706,9 @@
           <a:lstStyle/>
           <a:p>
             <a:r>
-              <a:rPr lang="en-US" dirty="0" smtClean="0"/>
+              <a:rPr lang="en-US" dirty="0"/>
               <a:t>From objects to services</a:t>
             </a:r>
-            <a:endParaRPr lang="en-US" dirty="0"/>
           </a:p>
         </p:txBody>
       </p:sp>
@@ -3469,13 +3722,6 @@
   <p:clrMapOvr>
     <a:masterClrMapping/>
   </p:clrMapOvr>
-  <p:timing>
-    <p:tnLst>
-      <p:par>
-        <p:cTn id="1" dur="indefinite" restart="never" nodeType="tmRoot"/>
-      </p:par>
-    </p:tnLst>
-  </p:timing>
 </p:sld>
 </file>
 
@@ -3512,10 +3758,9 @@
           <a:lstStyle/>
           <a:p>
             <a:r>
-              <a:rPr lang="en-US" dirty="0" smtClean="0"/>
+              <a:rPr lang="en-US" dirty="0"/>
               <a:t>What we’ll cover</a:t>
             </a:r>
-            <a:endParaRPr lang="en-US" dirty="0"/>
           </a:p>
         </p:txBody>
       </p:sp>
@@ -3534,36 +3779,51 @@
           <a:bodyPr/>
           <a:lstStyle/>
           <a:p>
-            <a:r>
-              <a:rPr lang="en-US" dirty="0" smtClean="0"/>
+            <a:pPr marL="0" indent="0">
+              <a:buNone/>
+            </a:pPr>
+            <a:r>
+              <a:rPr lang="en-US" dirty="0"/>
               <a:t>Distributed computing</a:t>
             </a:r>
           </a:p>
           <a:p>
-            <a:r>
-              <a:rPr lang="en-US" dirty="0" smtClean="0"/>
+            <a:pPr marL="0" indent="0">
+              <a:buNone/>
+            </a:pPr>
+            <a:r>
+              <a:rPr lang="en-US" dirty="0"/>
               <a:t>Distributed</a:t>
             </a:r>
             <a:r>
-              <a:rPr lang="en-US" baseline="0" dirty="0" smtClean="0"/>
+              <a:rPr lang="en-US" baseline="0" dirty="0"/>
               <a:t> objects and RPC</a:t>
             </a:r>
           </a:p>
           <a:p>
-            <a:r>
-              <a:rPr lang="en-US" baseline="0" dirty="0" smtClean="0"/>
+            <a:pPr marL="0" indent="0">
+              <a:buNone/>
+            </a:pPr>
+            <a:r>
+              <a:rPr lang="en-US" baseline="0" dirty="0"/>
               <a:t>The client-server model</a:t>
             </a:r>
           </a:p>
           <a:p>
-            <a:r>
-              <a:rPr lang="en-US" baseline="0" dirty="0" smtClean="0"/>
+            <a:pPr marL="0" indent="0">
+              <a:buNone/>
+            </a:pPr>
+            <a:r>
+              <a:rPr lang="en-US" baseline="0" dirty="0"/>
               <a:t>N-tier models</a:t>
             </a:r>
           </a:p>
           <a:p>
-            <a:r>
-              <a:rPr lang="en-US" baseline="0" dirty="0" smtClean="0"/>
+            <a:pPr marL="0" indent="0">
+              <a:buNone/>
+            </a:pPr>
+            <a:r>
+              <a:rPr lang="en-US" baseline="0" dirty="0"/>
               <a:t>Distribution across time and space</a:t>
             </a:r>
           </a:p>
@@ -3579,13 +3839,6 @@
   <p:clrMapOvr>
     <a:masterClrMapping/>
   </p:clrMapOvr>
-  <p:timing>
-    <p:tnLst>
-      <p:par>
-        <p:cTn id="1" dur="indefinite" restart="never" nodeType="tmRoot"/>
-      </p:par>
-    </p:tnLst>
-  </p:timing>
 </p:sld>
 </file>
 
@@ -3622,10 +3875,9 @@
           <a:lstStyle/>
           <a:p>
             <a:r>
-              <a:rPr lang="en-US" dirty="0" smtClean="0"/>
+              <a:rPr lang="en-US" dirty="0"/>
               <a:t>Distributed computing</a:t>
             </a:r>
-            <a:endParaRPr lang="en-US" dirty="0"/>
           </a:p>
         </p:txBody>
       </p:sp>
@@ -3644,24 +3896,33 @@
           <a:bodyPr/>
           <a:lstStyle/>
           <a:p>
-            <a:r>
-              <a:rPr lang="en-US" dirty="0" smtClean="0"/>
+            <a:pPr marL="0" indent="0">
+              <a:buNone/>
+            </a:pPr>
+            <a:r>
+              <a:rPr lang="en-US" dirty="0"/>
               <a:t>What do we mean</a:t>
             </a:r>
           </a:p>
           <a:p>
-            <a:r>
-              <a:rPr lang="en-US" dirty="0" smtClean="0"/>
+            <a:pPr marL="0" indent="0">
+              <a:buNone/>
+            </a:pPr>
+            <a:r>
+              <a:rPr lang="en-US" dirty="0"/>
               <a:t>Why</a:t>
             </a:r>
             <a:r>
-              <a:rPr lang="en-US" baseline="0" dirty="0" smtClean="0"/>
+              <a:rPr lang="en-US" baseline="0" dirty="0"/>
               <a:t> do we want to distribute computing</a:t>
             </a:r>
           </a:p>
           <a:p>
-            <a:r>
-              <a:rPr lang="en-US" baseline="0" dirty="0" smtClean="0"/>
+            <a:pPr marL="0" indent="0">
+              <a:buNone/>
+            </a:pPr>
+            <a:r>
+              <a:rPr lang="en-US" baseline="0" dirty="0"/>
               <a:t>When would we not want to distribute</a:t>
             </a:r>
           </a:p>
@@ -3677,13 +3938,6 @@
   <p:clrMapOvr>
     <a:masterClrMapping/>
   </p:clrMapOvr>
-  <p:timing>
-    <p:tnLst>
-      <p:par>
-        <p:cTn id="1" dur="indefinite" restart="never" nodeType="tmRoot"/>
-      </p:par>
-    </p:tnLst>
-  </p:timing>
 </p:sld>
 </file>
 
@@ -3720,10 +3974,9 @@
           <a:lstStyle/>
           <a:p>
             <a:r>
-              <a:rPr lang="en-US" dirty="0" smtClean="0"/>
+              <a:rPr lang="en-US" dirty="0"/>
               <a:t>Examples</a:t>
             </a:r>
-            <a:endParaRPr lang="en-US" dirty="0"/>
           </a:p>
         </p:txBody>
       </p:sp>
@@ -3742,51 +3995,62 @@
           <a:bodyPr/>
           <a:lstStyle/>
           <a:p>
-            <a:r>
-              <a:rPr lang="en-US" dirty="0" smtClean="0"/>
+            <a:pPr marL="0" indent="0">
+              <a:buNone/>
+            </a:pPr>
+            <a:r>
+              <a:rPr lang="en-US" dirty="0"/>
               <a:t>Video-on-demand</a:t>
             </a:r>
           </a:p>
           <a:p>
-            <a:r>
-              <a:rPr lang="en-US" dirty="0" smtClean="0"/>
+            <a:pPr marL="0" indent="0">
+              <a:buNone/>
+            </a:pPr>
+            <a:r>
+              <a:rPr lang="en-US" dirty="0"/>
               <a:t>Configuration</a:t>
             </a:r>
             <a:r>
-              <a:rPr lang="en-US" baseline="0" dirty="0" smtClean="0"/>
+              <a:rPr lang="en-US" baseline="0" dirty="0"/>
               <a:t> management systems</a:t>
             </a:r>
           </a:p>
           <a:p>
-            <a:r>
-              <a:rPr lang="en-US" baseline="0" dirty="0" smtClean="0"/>
+            <a:pPr marL="0" indent="0">
+              <a:buNone/>
+            </a:pPr>
+            <a:r>
+              <a:rPr lang="en-US" baseline="0" dirty="0"/>
               <a:t>IT infrastructure</a:t>
             </a:r>
           </a:p>
           <a:p>
-            <a:r>
-              <a:rPr lang="en-US" baseline="0" dirty="0" smtClean="0"/>
+            <a:pPr marL="0" indent="0">
+              <a:buNone/>
+            </a:pPr>
+            <a:r>
+              <a:rPr lang="en-US" baseline="0" dirty="0"/>
               <a:t>Centralized model vs. distributed model</a:t>
             </a:r>
           </a:p>
           <a:p>
-            <a:r>
-              <a:rPr lang="en-US" dirty="0" smtClean="0"/>
-              <a:t>The </a:t>
-            </a:r>
-            <a:r>
-              <a:rPr lang="en-US" smtClean="0"/>
-              <a:t>N</a:t>
-            </a:r>
-            <a:r>
-              <a:rPr lang="en-US" baseline="30000" smtClean="0"/>
+            <a:pPr marL="0" indent="0">
+              <a:buNone/>
+            </a:pPr>
+            <a:r>
+              <a:rPr lang="en-US" dirty="0"/>
+              <a:t>The N</a:t>
+            </a:r>
+            <a:r>
+              <a:rPr lang="en-US" baseline="30000" dirty="0"/>
               <a:t>2</a:t>
             </a:r>
             <a:r>
-              <a:rPr lang="en-US" smtClean="0"/>
+              <a:rPr lang="en-US" dirty="0"/>
               <a:t> communication problem</a:t>
             </a:r>
-            <a:endParaRPr lang="en-US" baseline="0" dirty="0" smtClean="0"/>
+            <a:endParaRPr lang="en-US" baseline="0" dirty="0"/>
           </a:p>
         </p:txBody>
       </p:sp>
@@ -3800,13 +4064,6 @@
   <p:clrMapOvr>
     <a:masterClrMapping/>
   </p:clrMapOvr>
-  <p:timing>
-    <p:tnLst>
-      <p:par>
-        <p:cTn id="1" dur="indefinite" restart="never" nodeType="tmRoot"/>
-      </p:par>
-    </p:tnLst>
-  </p:timing>
 </p:sld>
 </file>
 
@@ -3843,10 +4100,9 @@
           <a:lstStyle/>
           <a:p>
             <a:r>
-              <a:rPr lang="en-US" dirty="0" smtClean="0"/>
+              <a:rPr lang="en-US" dirty="0"/>
               <a:t>Distributed systems requirements</a:t>
             </a:r>
-            <a:endParaRPr lang="en-US" dirty="0"/>
           </a:p>
         </p:txBody>
       </p:sp>
@@ -3865,36 +4121,51 @@
           <a:bodyPr/>
           <a:lstStyle/>
           <a:p>
-            <a:r>
-              <a:rPr lang="en-US" dirty="0" smtClean="0"/>
+            <a:pPr marL="0" indent="0">
+              <a:buNone/>
+            </a:pPr>
+            <a:r>
+              <a:rPr lang="en-US" dirty="0"/>
               <a:t>Scalability</a:t>
             </a:r>
           </a:p>
           <a:p>
-            <a:r>
-              <a:rPr lang="en-US" dirty="0" smtClean="0"/>
+            <a:pPr marL="0" indent="0">
+              <a:buNone/>
+            </a:pPr>
+            <a:r>
+              <a:rPr lang="en-US" dirty="0"/>
               <a:t>Openness</a:t>
             </a:r>
           </a:p>
           <a:p>
-            <a:r>
-              <a:rPr lang="en-US" dirty="0" smtClean="0"/>
+            <a:pPr marL="0" indent="0">
+              <a:buNone/>
+            </a:pPr>
+            <a:r>
+              <a:rPr lang="en-US" dirty="0"/>
               <a:t>Heterogeneity</a:t>
             </a:r>
           </a:p>
           <a:p>
-            <a:r>
-              <a:rPr lang="en-US" dirty="0" smtClean="0"/>
+            <a:pPr marL="0" indent="0">
+              <a:buNone/>
+            </a:pPr>
+            <a:r>
+              <a:rPr lang="en-US" dirty="0"/>
               <a:t>Resource</a:t>
             </a:r>
             <a:r>
-              <a:rPr lang="en-US" baseline="0" dirty="0" smtClean="0"/>
+              <a:rPr lang="en-US" baseline="0" dirty="0"/>
               <a:t> access and sharing</a:t>
             </a:r>
           </a:p>
           <a:p>
-            <a:r>
-              <a:rPr lang="en-US" dirty="0" smtClean="0"/>
+            <a:pPr marL="0" indent="0">
+              <a:buNone/>
+            </a:pPr>
+            <a:r>
+              <a:rPr lang="en-US" dirty="0"/>
               <a:t>Fault-tolerance</a:t>
             </a:r>
           </a:p>
@@ -3910,13 +4181,6 @@
   <p:clrMapOvr>
     <a:masterClrMapping/>
   </p:clrMapOvr>
-  <p:timing>
-    <p:tnLst>
-      <p:par>
-        <p:cTn id="1" dur="indefinite" restart="never" nodeType="tmRoot"/>
-      </p:par>
-    </p:tnLst>
-  </p:timing>
 </p:sld>
 </file>
 
@@ -3953,11 +4217,11 @@
           <a:lstStyle/>
           <a:p>
             <a:r>
-              <a:rPr lang="en-US" dirty="0" smtClean="0"/>
+              <a:rPr lang="en-US" dirty="0"/>
               <a:t>Transparency</a:t>
             </a:r>
             <a:r>
-              <a:rPr lang="en-US" baseline="0" dirty="0" smtClean="0"/>
+              <a:rPr lang="en-US" baseline="0" dirty="0"/>
               <a:t> in distributed systems</a:t>
             </a:r>
             <a:endParaRPr lang="en-US" dirty="0"/>
@@ -3979,54 +4243,78 @@
           <a:bodyPr/>
           <a:lstStyle/>
           <a:p>
-            <a:r>
-              <a:rPr lang="en-US" dirty="0" smtClean="0"/>
+            <a:pPr marL="0" indent="0">
+              <a:buNone/>
+            </a:pPr>
+            <a:r>
+              <a:rPr lang="en-US" dirty="0"/>
               <a:t>Access transparency</a:t>
             </a:r>
           </a:p>
           <a:p>
-            <a:r>
-              <a:rPr lang="en-US" dirty="0" smtClean="0"/>
+            <a:pPr marL="0" indent="0">
+              <a:buNone/>
+            </a:pPr>
+            <a:r>
+              <a:rPr lang="en-US" dirty="0"/>
               <a:t>Location transparency</a:t>
             </a:r>
           </a:p>
           <a:p>
-            <a:r>
-              <a:rPr lang="en-US" dirty="0" smtClean="0"/>
+            <a:pPr marL="0" indent="0">
+              <a:buNone/>
+            </a:pPr>
+            <a:r>
+              <a:rPr lang="en-US" dirty="0"/>
               <a:t>Migration</a:t>
             </a:r>
             <a:r>
-              <a:rPr lang="en-US" baseline="0" dirty="0" smtClean="0"/>
+              <a:rPr lang="en-US" baseline="0" dirty="0"/>
               <a:t> transparency</a:t>
             </a:r>
           </a:p>
           <a:p>
-            <a:r>
-              <a:rPr lang="en-US" baseline="0" dirty="0" smtClean="0"/>
+            <a:pPr marL="0" indent="0">
+              <a:buNone/>
+            </a:pPr>
+            <a:r>
+              <a:rPr lang="en-US" baseline="0" dirty="0"/>
               <a:t>Replication transparency</a:t>
             </a:r>
           </a:p>
           <a:p>
-            <a:r>
-              <a:rPr lang="en-US" baseline="0" dirty="0" smtClean="0"/>
+            <a:pPr marL="0" indent="0">
+              <a:buNone/>
+            </a:pPr>
+            <a:r>
+              <a:rPr lang="en-US" baseline="0" dirty="0"/>
               <a:t>Concurrency transparency</a:t>
             </a:r>
           </a:p>
           <a:p>
-            <a:r>
-              <a:rPr lang="en-US" baseline="0" dirty="0" smtClean="0"/>
+            <a:pPr marL="0" indent="0">
+              <a:buNone/>
+            </a:pPr>
+            <a:r>
+              <a:rPr lang="en-US" baseline="0" dirty="0"/>
               <a:t>Scalability transparency</a:t>
             </a:r>
           </a:p>
           <a:p>
-            <a:r>
-              <a:rPr lang="en-US" baseline="0" dirty="0" smtClean="0"/>
+            <a:pPr marL="0" indent="0">
+              <a:buNone/>
+            </a:pPr>
+            <a:r>
+              <a:rPr lang="en-US" baseline="0" dirty="0"/>
               <a:t>Performance transparency</a:t>
             </a:r>
           </a:p>
           <a:p>
-            <a:r>
-              <a:rPr lang="en-US" baseline="0" dirty="0" smtClean="0"/>
+            <a:pPr marL="0" indent="0">
+              <a:buNone/>
+            </a:pPr>
+            <a:r>
+              <a:rPr lang="en-US" baseline="0" dirty="0"/>
               <a:t>Failure transparency</a:t>
             </a:r>
             <a:endParaRPr lang="en-US" dirty="0"/>
@@ -4043,13 +4331,6 @@
   <p:clrMapOvr>
     <a:masterClrMapping/>
   </p:clrMapOvr>
-  <p:timing>
-    <p:tnLst>
-      <p:par>
-        <p:cTn id="1" dur="indefinite" restart="never" nodeType="tmRoot"/>
-      </p:par>
-    </p:tnLst>
-  </p:timing>
 </p:sld>
 </file>
 
@@ -4072,7 +4353,7 @@
       </p:grpSpPr>
       <p:sp>
         <p:nvSpPr>
-          <p:cNvPr id="4" name="Title 3"/>
+          <p:cNvPr id="5" name="Title 4"/>
           <p:cNvSpPr>
             <a:spLocks noGrp="1"/>
           </p:cNvSpPr>
@@ -4086,86 +4367,9 @@
           <a:lstStyle/>
           <a:p>
             <a:r>
-              <a:rPr lang="en-US" dirty="0" smtClean="0"/>
-              <a:t>Optimization</a:t>
-            </a:r>
-            <a:endParaRPr lang="en-US" dirty="0"/>
-          </a:p>
-        </p:txBody>
-      </p:sp>
-      <p:sp>
-        <p:nvSpPr>
-          <p:cNvPr id="5" name="Text Placeholder 4"/>
-          <p:cNvSpPr>
-            <a:spLocks noGrp="1"/>
-          </p:cNvSpPr>
-          <p:nvPr>
-            <p:ph type="body" idx="1"/>
-          </p:nvPr>
-        </p:nvSpPr>
-        <p:spPr/>
-        <p:txBody>
-          <a:bodyPr/>
-          <a:lstStyle/>
-          <a:p>
-            <a:r>
-              <a:rPr lang="en-US" dirty="0" smtClean="0"/>
-              <a:t>When is too much too much</a:t>
-            </a:r>
-            <a:endParaRPr lang="en-US" dirty="0"/>
-          </a:p>
-        </p:txBody>
-      </p:sp>
-    </p:spTree>
-    <p:extLst>
-      <p:ext uri="{BB962C8B-B14F-4D97-AF65-F5344CB8AC3E}">
-        <p14:creationId xmlns:p14="http://schemas.microsoft.com/office/powerpoint/2010/main" val="1948856545"/>
-      </p:ext>
-    </p:extLst>
-  </p:cSld>
-  <p:clrMapOvr>
-    <a:masterClrMapping/>
-  </p:clrMapOvr>
-</p:sld>
-</file>
-
-<file path=ppt/slides/slide9.xml><?xml version="1.0" encoding="utf-8"?>
-<p:sld xmlns:a="http://schemas.openxmlformats.org/drawingml/2006/main" xmlns:r="http://schemas.openxmlformats.org/officeDocument/2006/relationships" xmlns:p="http://schemas.openxmlformats.org/presentationml/2006/main">
-  <p:cSld>
-    <p:spTree>
-      <p:nvGrpSpPr>
-        <p:cNvPr id="1" name=""/>
-        <p:cNvGrpSpPr/>
-        <p:nvPr/>
-      </p:nvGrpSpPr>
-      <p:grpSpPr>
-        <a:xfrm>
-          <a:off x="0" y="0"/>
-          <a:ext cx="0" cy="0"/>
-          <a:chOff x="0" y="0"/>
-          <a:chExt cx="0" cy="0"/>
-        </a:xfrm>
-      </p:grpSpPr>
-      <p:sp>
-        <p:nvSpPr>
-          <p:cNvPr id="5" name="Title 4"/>
-          <p:cNvSpPr>
-            <a:spLocks noGrp="1"/>
-          </p:cNvSpPr>
-          <p:nvPr>
-            <p:ph type="title"/>
-          </p:nvPr>
-        </p:nvSpPr>
-        <p:spPr/>
-        <p:txBody>
-          <a:bodyPr/>
-          <a:lstStyle/>
-          <a:p>
-            <a:r>
-              <a:rPr lang="en-US" dirty="0" smtClean="0"/>
+              <a:rPr lang="en-US" dirty="0"/>
               <a:t>For next week</a:t>
             </a:r>
-            <a:endParaRPr lang="en-US" dirty="0"/>
           </a:p>
         </p:txBody>
       </p:sp>
@@ -4182,33 +4386,53 @@
         <p:spPr/>
         <p:txBody>
           <a:bodyPr>
-            <a:normAutofit/>
+            <a:normAutofit fontScale="92500" lnSpcReduction="10000"/>
           </a:bodyPr>
           <a:lstStyle/>
           <a:p>
-            <a:r>
-              <a:rPr lang="en-US" smtClean="0"/>
+            <a:pPr marL="0" indent="0">
+              <a:buNone/>
+            </a:pPr>
+            <a:r>
+              <a:rPr lang="en-US" dirty="0"/>
               <a:t>Reading</a:t>
             </a:r>
-            <a:endParaRPr lang="en-US" dirty="0" smtClean="0"/>
           </a:p>
           <a:p>
             <a:pPr marL="457200" lvl="1" indent="0">
               <a:buNone/>
             </a:pPr>
             <a:r>
-              <a:rPr lang="en-US" sz="2000" dirty="0">
-                <a:hlinkClick r:id="rId2"/>
-              </a:rPr>
-              <a:t>http://</a:t>
-            </a:r>
-            <a:r>
-              <a:rPr lang="en-US" sz="2000" dirty="0" smtClean="0">
-                <a:hlinkClick r:id="rId2"/>
-              </a:rPr>
-              <a:t>www.amazon.com/Framework-Design-Guidelines-Conventions-Libraries/dp/0321545613</a:t>
-            </a:r>
-            <a:endParaRPr lang="en-US" sz="2000" dirty="0" smtClean="0"/>
+              <a:rPr lang="en-US" sz="2000" b="1" dirty="0"/>
+              <a:t>API Design Matters </a:t>
+            </a:r>
+            <a:r>
+              <a:rPr lang="en-US" sz="2000" dirty="0"/>
+              <a:t>from ~/readings in our </a:t>
+            </a:r>
+            <a:r>
+              <a:rPr lang="en-US" sz="2000" dirty="0" err="1"/>
+              <a:t>github</a:t>
+            </a:r>
+            <a:r>
+              <a:rPr lang="en-US" sz="2000" dirty="0"/>
+              <a:t> repo</a:t>
+            </a:r>
+          </a:p>
+          <a:p>
+            <a:pPr marL="457200" lvl="1" indent="0">
+              <a:buNone/>
+            </a:pPr>
+            <a:endParaRPr lang="en-US" sz="2000" dirty="0"/>
+          </a:p>
+          <a:p>
+            <a:pPr marL="0" indent="0">
+              <a:buNone/>
+            </a:pPr>
+            <a:r>
+              <a:rPr lang="en-US" sz="2400" dirty="0"/>
+              <a:t>Programming language idioms</a:t>
+            </a:r>
           </a:p>
           <a:p>
             <a:pPr marL="457200" lvl="1" indent="0">
@@ -4218,23 +4442,88 @@
               <a:rPr lang="en-US" sz="2000" dirty="0">
                 <a:hlinkClick r:id="rId3"/>
               </a:rPr>
-              <a:t>http://</a:t>
-            </a:r>
-            <a:r>
-              <a:rPr lang="en-US" sz="2000" dirty="0" smtClean="0">
-                <a:hlinkClick r:id="rId3"/>
+              <a:t>https://en.wikipedia.org/wiki/Filter_(higher-order_function)</a:t>
+            </a:r>
+            <a:endParaRPr lang="en-US" sz="2000" dirty="0"/>
+          </a:p>
+          <a:p>
+            <a:pPr marL="457200" lvl="1" indent="0">
+              <a:buNone/>
+            </a:pPr>
+            <a:r>
+              <a:rPr lang="en-US" sz="2000" dirty="0">
+                <a:hlinkClick r:id="rId4"/>
               </a:rPr>
-              <a:t>queue.acm.org/detail.cfm?id=1255422</a:t>
-            </a:r>
-            <a:endParaRPr lang="en-US" sz="2000" dirty="0" smtClean="0"/>
+              <a:t>https://en.wikipedia.org/wiki/Map_(higher-order_function)</a:t>
+            </a:r>
+            <a:endParaRPr lang="en-US" sz="2000" dirty="0"/>
+          </a:p>
+          <a:p>
+            <a:pPr marL="457200" lvl="1" indent="0">
+              <a:buNone/>
+            </a:pPr>
+            <a:r>
+              <a:rPr lang="en-US" sz="2000" dirty="0">
+                <a:hlinkClick r:id="rId5"/>
+              </a:rPr>
+              <a:t>https://en.wikipedia.org/wiki/Fold_(higher-order_function)</a:t>
+            </a:r>
+            <a:endParaRPr lang="en-US" sz="2000" dirty="0"/>
+          </a:p>
+          <a:p>
+            <a:pPr marL="457200" lvl="1" indent="0">
+              <a:buNone/>
+            </a:pPr>
+            <a:r>
+              <a:rPr lang="en-US" sz="2000" dirty="0">
+                <a:hlinkClick r:id="rId6"/>
+              </a:rPr>
+              <a:t>https://en.wikipedia.org/wiki/List_comprehension</a:t>
+            </a:r>
+            <a:endParaRPr lang="en-US" sz="2000" dirty="0"/>
           </a:p>
           <a:p>
             <a:pPr lvl="1"/>
-            <a:endParaRPr lang="en-US" dirty="0" smtClean="0"/>
-          </a:p>
-          <a:p>
-            <a:pPr lvl="1"/>
-            <a:endParaRPr lang="en-US" b="0" baseline="0" dirty="0" smtClean="0"/>
+            <a:endParaRPr lang="en-US" dirty="0"/>
+          </a:p>
+          <a:p>
+            <a:pPr marL="0" indent="0">
+              <a:buNone/>
+            </a:pPr>
+            <a:r>
+              <a:rPr lang="en-US" sz="2200" b="1" baseline="0" dirty="0"/>
+              <a:t>But why? </a:t>
+            </a:r>
+          </a:p>
+          <a:p>
+            <a:pPr marL="0" indent="0">
+              <a:buNone/>
+            </a:pPr>
+            <a:r>
+              <a:rPr lang="en-US" sz="2200" b="0" baseline="0" dirty="0"/>
+              <a:t>The first three cover the basic idioms of </a:t>
+            </a:r>
+            <a:r>
+              <a:rPr lang="en-US" sz="2200" b="0" i="1" baseline="0" dirty="0"/>
+              <a:t>functional programming</a:t>
+            </a:r>
+            <a:r>
+              <a:rPr lang="en-US" sz="2200" b="0" baseline="0" dirty="0"/>
+              <a:t> but</a:t>
+            </a:r>
+            <a:r>
+              <a:rPr lang="en-US" sz="2200" dirty="0"/>
+              <a:t> provide a comparison to several other languages. The </a:t>
+            </a:r>
+            <a:r>
+              <a:rPr lang="en-US" sz="2200" i="1" dirty="0"/>
+              <a:t>list comprehension</a:t>
+            </a:r>
+            <a:r>
+              <a:rPr lang="en-US" sz="2200" dirty="0"/>
+              <a:t> article doesn’t include the nice table, but still shows idioms for list construction and initialization.</a:t>
+            </a:r>
+            <a:endParaRPr lang="en-US" sz="2200" b="0" baseline="0" dirty="0"/>
           </a:p>
         </p:txBody>
       </p:sp>
@@ -4248,13 +4537,6 @@
   <p:clrMapOvr>
     <a:masterClrMapping/>
   </p:clrMapOvr>
-  <p:timing>
-    <p:tnLst>
-      <p:par>
-        <p:cTn id="1" dur="indefinite" restart="never" nodeType="tmRoot"/>
-      </p:par>
-    </p:tnLst>
-  </p:timing>
 </p:sld>
 </file>
 

</xml_diff>